<commit_message>
Code beautify and added comments
</commit_message>
<xml_diff>
--- a/Report.pptx
+++ b/Report.pptx
@@ -5,7 +5,7 @@
     <p:sldMasterId id="2147483648" r:id="rId1"/>
   </p:sldMasterIdLst>
   <p:notesMasterIdLst>
-    <p:notesMasterId r:id="rId20"/>
+    <p:notesMasterId r:id="rId22"/>
   </p:notesMasterIdLst>
   <p:sldIdLst>
     <p:sldId id="256" r:id="rId2"/>
@@ -23,9 +23,11 @@
     <p:sldId id="273" r:id="rId14"/>
     <p:sldId id="274" r:id="rId15"/>
     <p:sldId id="275" r:id="rId16"/>
-    <p:sldId id="276" r:id="rId17"/>
-    <p:sldId id="277" r:id="rId18"/>
-    <p:sldId id="278" r:id="rId19"/>
+    <p:sldId id="279" r:id="rId17"/>
+    <p:sldId id="280" r:id="rId18"/>
+    <p:sldId id="276" r:id="rId19"/>
+    <p:sldId id="277" r:id="rId20"/>
+    <p:sldId id="278" r:id="rId21"/>
   </p:sldIdLst>
   <p:sldSz cx="12192000" cy="6858000"/>
   <p:notesSz cx="6858000" cy="9144000"/>
@@ -135,7 +137,7 @@
 <file path=ppt/revisionInfo.xml><?xml version="1.0" encoding="utf-8"?>
 <p1510:revInfo xmlns:a="http://schemas.openxmlformats.org/drawingml/2006/main" xmlns:r="http://schemas.openxmlformats.org/officeDocument/2006/relationships" xmlns:p1510="http://schemas.microsoft.com/office/powerpoint/2015/10/main">
   <p1510:revLst>
-    <p1510:client id="{22D272E4-2158-41E7-8704-8F465140BCC8}" v="43" dt="2023-12-29T18:05:00.318"/>
+    <p1510:client id="{22D272E4-2158-41E7-8704-8F465140BCC8}" v="45" dt="2023-12-30T10:42:20.599"/>
   </p1510:revLst>
 </p1510:revInfo>
 </file>
@@ -145,7 +147,7 @@
   <pc:docChgLst>
     <pc:chgData name="Tommaso Di Riccio" userId="86fd86f00952e091" providerId="LiveId" clId="{22D272E4-2158-41E7-8704-8F465140BCC8}"/>
     <pc:docChg chg="undo redo custSel addSld delSld modSld">
-      <pc:chgData name="Tommaso Di Riccio" userId="86fd86f00952e091" providerId="LiveId" clId="{22D272E4-2158-41E7-8704-8F465140BCC8}" dt="2023-12-29T19:07:42.816" v="7467" actId="20577"/>
+      <pc:chgData name="Tommaso Di Riccio" userId="86fd86f00952e091" providerId="LiveId" clId="{22D272E4-2158-41E7-8704-8F465140BCC8}" dt="2023-12-30T11:41:41.551" v="8680" actId="680"/>
       <pc:docMkLst>
         <pc:docMk/>
       </pc:docMkLst>
@@ -819,7 +821,7 @@
         </pc:graphicFrameChg>
       </pc:sldChg>
       <pc:sldChg chg="addSp delSp modSp add mod">
-        <pc:chgData name="Tommaso Di Riccio" userId="86fd86f00952e091" providerId="LiveId" clId="{22D272E4-2158-41E7-8704-8F465140BCC8}" dt="2023-12-29T16:14:15.686" v="4852" actId="20577"/>
+        <pc:chgData name="Tommaso Di Riccio" userId="86fd86f00952e091" providerId="LiveId" clId="{22D272E4-2158-41E7-8704-8F465140BCC8}" dt="2023-12-30T10:40:37.070" v="7742" actId="20577"/>
         <pc:sldMkLst>
           <pc:docMk/>
           <pc:sldMk cId="2557478514" sldId="274"/>
@@ -841,7 +843,7 @@
           </ac:spMkLst>
         </pc:spChg>
         <pc:graphicFrameChg chg="add mod modGraphic">
-          <ac:chgData name="Tommaso Di Riccio" userId="86fd86f00952e091" providerId="LiveId" clId="{22D272E4-2158-41E7-8704-8F465140BCC8}" dt="2023-12-29T16:14:15.686" v="4852" actId="20577"/>
+          <ac:chgData name="Tommaso Di Riccio" userId="86fd86f00952e091" providerId="LiveId" clId="{22D272E4-2158-41E7-8704-8F465140BCC8}" dt="2023-12-30T10:40:37.070" v="7742" actId="20577"/>
           <ac:graphicFrameMkLst>
             <pc:docMk/>
             <pc:sldMk cId="2557478514" sldId="274"/>
@@ -850,13 +852,13 @@
         </pc:graphicFrameChg>
       </pc:sldChg>
       <pc:sldChg chg="addSp delSp modSp add mod">
-        <pc:chgData name="Tommaso Di Riccio" userId="86fd86f00952e091" providerId="LiveId" clId="{22D272E4-2158-41E7-8704-8F465140BCC8}" dt="2023-12-29T17:50:41.170" v="5825" actId="1036"/>
+        <pc:chgData name="Tommaso Di Riccio" userId="86fd86f00952e091" providerId="LiveId" clId="{22D272E4-2158-41E7-8704-8F465140BCC8}" dt="2023-12-30T10:48:18.418" v="8242" actId="1038"/>
         <pc:sldMkLst>
           <pc:docMk/>
           <pc:sldMk cId="772628214" sldId="275"/>
         </pc:sldMkLst>
         <pc:spChg chg="add mod">
-          <ac:chgData name="Tommaso Di Riccio" userId="86fd86f00952e091" providerId="LiveId" clId="{22D272E4-2158-41E7-8704-8F465140BCC8}" dt="2023-12-29T17:14:23.187" v="5253" actId="1038"/>
+          <ac:chgData name="Tommaso Di Riccio" userId="86fd86f00952e091" providerId="LiveId" clId="{22D272E4-2158-41E7-8704-8F465140BCC8}" dt="2023-12-30T10:48:18.418" v="8242" actId="1038"/>
           <ac:spMkLst>
             <pc:docMk/>
             <pc:sldMk cId="772628214" sldId="275"/>
@@ -864,7 +866,7 @@
           </ac:spMkLst>
         </pc:spChg>
         <pc:spChg chg="add mod">
-          <ac:chgData name="Tommaso Di Riccio" userId="86fd86f00952e091" providerId="LiveId" clId="{22D272E4-2158-41E7-8704-8F465140BCC8}" dt="2023-12-29T17:18:17.340" v="5260" actId="1038"/>
+          <ac:chgData name="Tommaso Di Riccio" userId="86fd86f00952e091" providerId="LiveId" clId="{22D272E4-2158-41E7-8704-8F465140BCC8}" dt="2023-12-30T10:48:18.418" v="8242" actId="1038"/>
           <ac:spMkLst>
             <pc:docMk/>
             <pc:sldMk cId="772628214" sldId="275"/>
@@ -872,7 +874,7 @@
           </ac:spMkLst>
         </pc:spChg>
         <pc:spChg chg="add mod">
-          <ac:chgData name="Tommaso Di Riccio" userId="86fd86f00952e091" providerId="LiveId" clId="{22D272E4-2158-41E7-8704-8F465140BCC8}" dt="2023-12-29T17:14:23.187" v="5253" actId="1038"/>
+          <ac:chgData name="Tommaso Di Riccio" userId="86fd86f00952e091" providerId="LiveId" clId="{22D272E4-2158-41E7-8704-8F465140BCC8}" dt="2023-12-30T10:48:18.418" v="8242" actId="1038"/>
           <ac:spMkLst>
             <pc:docMk/>
             <pc:sldMk cId="772628214" sldId="275"/>
@@ -1127,13 +1129,13 @@
         </pc:picChg>
       </pc:sldChg>
       <pc:sldChg chg="modSp add mod">
-        <pc:chgData name="Tommaso Di Riccio" userId="86fd86f00952e091" providerId="LiveId" clId="{22D272E4-2158-41E7-8704-8F465140BCC8}" dt="2023-12-29T18:35:03.024" v="7179" actId="20577"/>
+        <pc:chgData name="Tommaso Di Riccio" userId="86fd86f00952e091" providerId="LiveId" clId="{22D272E4-2158-41E7-8704-8F465140BCC8}" dt="2023-12-30T10:29:34.832" v="7604" actId="20577"/>
         <pc:sldMkLst>
           <pc:docMk/>
           <pc:sldMk cId="689527355" sldId="277"/>
         </pc:sldMkLst>
         <pc:spChg chg="mod">
-          <ac:chgData name="Tommaso Di Riccio" userId="86fd86f00952e091" providerId="LiveId" clId="{22D272E4-2158-41E7-8704-8F465140BCC8}" dt="2023-12-29T18:35:03.024" v="7179" actId="20577"/>
+          <ac:chgData name="Tommaso Di Riccio" userId="86fd86f00952e091" providerId="LiveId" clId="{22D272E4-2158-41E7-8704-8F465140BCC8}" dt="2023-12-30T10:29:34.832" v="7604" actId="20577"/>
           <ac:spMkLst>
             <pc:docMk/>
             <pc:sldMk cId="689527355" sldId="277"/>
@@ -1142,13 +1144,13 @@
         </pc:spChg>
       </pc:sldChg>
       <pc:sldChg chg="modSp add mod">
-        <pc:chgData name="Tommaso Di Riccio" userId="86fd86f00952e091" providerId="LiveId" clId="{22D272E4-2158-41E7-8704-8F465140BCC8}" dt="2023-12-29T19:07:42.816" v="7467" actId="20577"/>
+        <pc:chgData name="Tommaso Di Riccio" userId="86fd86f00952e091" providerId="LiveId" clId="{22D272E4-2158-41E7-8704-8F465140BCC8}" dt="2023-12-30T10:36:18.117" v="7640" actId="20577"/>
         <pc:sldMkLst>
           <pc:docMk/>
           <pc:sldMk cId="2108753129" sldId="278"/>
         </pc:sldMkLst>
         <pc:spChg chg="mod">
-          <ac:chgData name="Tommaso Di Riccio" userId="86fd86f00952e091" providerId="LiveId" clId="{22D272E4-2158-41E7-8704-8F465140BCC8}" dt="2023-12-29T18:45:08.579" v="7190" actId="20577"/>
+          <ac:chgData name="Tommaso Di Riccio" userId="86fd86f00952e091" providerId="LiveId" clId="{22D272E4-2158-41E7-8704-8F465140BCC8}" dt="2023-12-30T10:36:18.117" v="7640" actId="20577"/>
           <ac:spMkLst>
             <pc:docMk/>
             <pc:sldMk cId="2108753129" sldId="278"/>
@@ -1156,13 +1158,123 @@
           </ac:spMkLst>
         </pc:spChg>
         <pc:spChg chg="mod">
-          <ac:chgData name="Tommaso Di Riccio" userId="86fd86f00952e091" providerId="LiveId" clId="{22D272E4-2158-41E7-8704-8F465140BCC8}" dt="2023-12-29T19:07:42.816" v="7467" actId="20577"/>
+          <ac:chgData name="Tommaso Di Riccio" userId="86fd86f00952e091" providerId="LiveId" clId="{22D272E4-2158-41E7-8704-8F465140BCC8}" dt="2023-12-30T10:36:03.162" v="7639" actId="1076"/>
           <ac:spMkLst>
             <pc:docMk/>
             <pc:sldMk cId="2108753129" sldId="278"/>
             <ac:spMk id="3" creationId="{0448DF09-38BE-4CA2-C490-2A9388B7B27C}"/>
           </ac:spMkLst>
         </pc:spChg>
+      </pc:sldChg>
+      <pc:sldChg chg="addSp delSp modSp add mod">
+        <pc:chgData name="Tommaso Di Riccio" userId="86fd86f00952e091" providerId="LiveId" clId="{22D272E4-2158-41E7-8704-8F465140BCC8}" dt="2023-12-30T10:58:23.474" v="8679" actId="1076"/>
+        <pc:sldMkLst>
+          <pc:docMk/>
+          <pc:sldMk cId="3208590103" sldId="279"/>
+        </pc:sldMkLst>
+        <pc:spChg chg="mod">
+          <ac:chgData name="Tommaso Di Riccio" userId="86fd86f00952e091" providerId="LiveId" clId="{22D272E4-2158-41E7-8704-8F465140BCC8}" dt="2023-12-30T10:41:53.455" v="7755" actId="20577"/>
+          <ac:spMkLst>
+            <pc:docMk/>
+            <pc:sldMk cId="3208590103" sldId="279"/>
+            <ac:spMk id="2" creationId="{32242F0D-F3C7-5888-B659-FAE035653A8D}"/>
+          </ac:spMkLst>
+        </pc:spChg>
+        <pc:spChg chg="add mod">
+          <ac:chgData name="Tommaso Di Riccio" userId="86fd86f00952e091" providerId="LiveId" clId="{22D272E4-2158-41E7-8704-8F465140BCC8}" dt="2023-12-30T10:58:23.474" v="8679" actId="1076"/>
+          <ac:spMkLst>
+            <pc:docMk/>
+            <pc:sldMk cId="3208590103" sldId="279"/>
+            <ac:spMk id="3" creationId="{54E0DD3B-63BC-7DC6-3291-D2FDFE5BC30B}"/>
+          </ac:spMkLst>
+        </pc:spChg>
+        <pc:spChg chg="del">
+          <ac:chgData name="Tommaso Di Riccio" userId="86fd86f00952e091" providerId="LiveId" clId="{22D272E4-2158-41E7-8704-8F465140BCC8}" dt="2023-12-30T10:41:46.650" v="7748" actId="478"/>
+          <ac:spMkLst>
+            <pc:docMk/>
+            <pc:sldMk cId="3208590103" sldId="279"/>
+            <ac:spMk id="4" creationId="{8C641C17-29F1-5A64-4F99-F93E2DCFF28B}"/>
+          </ac:spMkLst>
+        </pc:spChg>
+        <pc:spChg chg="del">
+          <ac:chgData name="Tommaso Di Riccio" userId="86fd86f00952e091" providerId="LiveId" clId="{22D272E4-2158-41E7-8704-8F465140BCC8}" dt="2023-12-30T10:41:46.650" v="7748" actId="478"/>
+          <ac:spMkLst>
+            <pc:docMk/>
+            <pc:sldMk cId="3208590103" sldId="279"/>
+            <ac:spMk id="7" creationId="{1DFBB0B1-2BA2-F8D4-9938-35F901E95237}"/>
+          </ac:spMkLst>
+        </pc:spChg>
+        <pc:spChg chg="del">
+          <ac:chgData name="Tommaso Di Riccio" userId="86fd86f00952e091" providerId="LiveId" clId="{22D272E4-2158-41E7-8704-8F465140BCC8}" dt="2023-12-30T10:41:46.650" v="7748" actId="478"/>
+          <ac:spMkLst>
+            <pc:docMk/>
+            <pc:sldMk cId="3208590103" sldId="279"/>
+            <ac:spMk id="14" creationId="{FDB0AC52-F07C-AB47-7DC9-7DF45BA4A73E}"/>
+          </ac:spMkLst>
+        </pc:spChg>
+        <pc:spChg chg="del">
+          <ac:chgData name="Tommaso Di Riccio" userId="86fd86f00952e091" providerId="LiveId" clId="{22D272E4-2158-41E7-8704-8F465140BCC8}" dt="2023-12-30T10:41:46.650" v="7748" actId="478"/>
+          <ac:spMkLst>
+            <pc:docMk/>
+            <pc:sldMk cId="3208590103" sldId="279"/>
+            <ac:spMk id="17" creationId="{0EDB4EE4-B470-A99C-10B1-C0A7AE2D1A69}"/>
+          </ac:spMkLst>
+        </pc:spChg>
+        <pc:spChg chg="del">
+          <ac:chgData name="Tommaso Di Riccio" userId="86fd86f00952e091" providerId="LiveId" clId="{22D272E4-2158-41E7-8704-8F465140BCC8}" dt="2023-12-30T10:41:46.650" v="7748" actId="478"/>
+          <ac:spMkLst>
+            <pc:docMk/>
+            <pc:sldMk cId="3208590103" sldId="279"/>
+            <ac:spMk id="18" creationId="{7DC219A2-9CCE-8674-BA91-882B35D286B1}"/>
+          </ac:spMkLst>
+        </pc:spChg>
+        <pc:spChg chg="del mod">
+          <ac:chgData name="Tommaso Di Riccio" userId="86fd86f00952e091" providerId="LiveId" clId="{22D272E4-2158-41E7-8704-8F465140BCC8}" dt="2023-12-30T10:41:46.650" v="7748" actId="478"/>
+          <ac:spMkLst>
+            <pc:docMk/>
+            <pc:sldMk cId="3208590103" sldId="279"/>
+            <ac:spMk id="19" creationId="{32CCE01E-9465-02BC-1F71-F77D545D0E68}"/>
+          </ac:spMkLst>
+        </pc:spChg>
+        <pc:spChg chg="del">
+          <ac:chgData name="Tommaso Di Riccio" userId="86fd86f00952e091" providerId="LiveId" clId="{22D272E4-2158-41E7-8704-8F465140BCC8}" dt="2023-12-30T10:41:46.650" v="7748" actId="478"/>
+          <ac:spMkLst>
+            <pc:docMk/>
+            <pc:sldMk cId="3208590103" sldId="279"/>
+            <ac:spMk id="20" creationId="{26D90E17-7A28-76E7-4A6E-D4991A3F6B9E}"/>
+          </ac:spMkLst>
+        </pc:spChg>
+        <pc:picChg chg="del">
+          <ac:chgData name="Tommaso Di Riccio" userId="86fd86f00952e091" providerId="LiveId" clId="{22D272E4-2158-41E7-8704-8F465140BCC8}" dt="2023-12-30T10:41:41.040" v="7744" actId="478"/>
+          <ac:picMkLst>
+            <pc:docMk/>
+            <pc:sldMk cId="3208590103" sldId="279"/>
+            <ac:picMk id="11" creationId="{9AD3F185-04A2-552C-50D3-ED8B41D1808A}"/>
+          </ac:picMkLst>
+        </pc:picChg>
+        <pc:picChg chg="del">
+          <ac:chgData name="Tommaso Di Riccio" userId="86fd86f00952e091" providerId="LiveId" clId="{22D272E4-2158-41E7-8704-8F465140BCC8}" dt="2023-12-30T10:41:41.441" v="7745" actId="478"/>
+          <ac:picMkLst>
+            <pc:docMk/>
+            <pc:sldMk cId="3208590103" sldId="279"/>
+            <ac:picMk id="13" creationId="{5FAF3382-625F-3D9D-10F2-68C1E0E633D1}"/>
+          </ac:picMkLst>
+        </pc:picChg>
+        <pc:picChg chg="del">
+          <ac:chgData name="Tommaso Di Riccio" userId="86fd86f00952e091" providerId="LiveId" clId="{22D272E4-2158-41E7-8704-8F465140BCC8}" dt="2023-12-30T10:41:41.960" v="7746" actId="478"/>
+          <ac:picMkLst>
+            <pc:docMk/>
+            <pc:sldMk cId="3208590103" sldId="279"/>
+            <ac:picMk id="16" creationId="{024CDACA-59AF-87E1-A293-656EDE936DCB}"/>
+          </ac:picMkLst>
+        </pc:picChg>
+      </pc:sldChg>
+      <pc:sldChg chg="new">
+        <pc:chgData name="Tommaso Di Riccio" userId="86fd86f00952e091" providerId="LiveId" clId="{22D272E4-2158-41E7-8704-8F465140BCC8}" dt="2023-12-30T11:41:41.551" v="8680" actId="680"/>
+        <pc:sldMkLst>
+          <pc:docMk/>
+          <pc:sldMk cId="32131640" sldId="280"/>
+        </pc:sldMkLst>
       </pc:sldChg>
     </pc:docChg>
   </pc:docChgLst>
@@ -1251,7 +1363,7 @@
           <a:p>
             <a:fld id="{DC6CAA1B-BAE1-43B3-A051-D11BAD98619E}" type="datetimeFigureOut">
               <a:rPr lang="it-IT" smtClean="0"/>
-              <a:t>29/12/2023</a:t>
+              <a:t>30/12/2023</a:t>
             </a:fld>
             <a:endParaRPr lang="it-IT"/>
           </a:p>
@@ -1665,7 +1777,7 @@
           <a:p>
             <a:fld id="{9597AF99-7543-4208-9A09-63750D099606}" type="datetime1">
               <a:rPr lang="it-IT" smtClean="0"/>
-              <a:t>29/12/2023</a:t>
+              <a:t>30/12/2023</a:t>
             </a:fld>
             <a:endParaRPr lang="it-IT"/>
           </a:p>
@@ -1863,7 +1975,7 @@
           <a:p>
             <a:fld id="{E7D30E2A-E2CD-447E-A8C4-934946B88184}" type="datetime1">
               <a:rPr lang="it-IT" smtClean="0"/>
-              <a:t>29/12/2023</a:t>
+              <a:t>30/12/2023</a:t>
             </a:fld>
             <a:endParaRPr lang="it-IT"/>
           </a:p>
@@ -2071,7 +2183,7 @@
           <a:p>
             <a:fld id="{D3027936-96D1-4F0C-920F-11252D1DCF7C}" type="datetime1">
               <a:rPr lang="it-IT" smtClean="0"/>
-              <a:t>29/12/2023</a:t>
+              <a:t>30/12/2023</a:t>
             </a:fld>
             <a:endParaRPr lang="it-IT"/>
           </a:p>
@@ -2269,7 +2381,7 @@
           <a:p>
             <a:fld id="{6E693176-7B9D-497B-B83D-24A130A73AD7}" type="datetime1">
               <a:rPr lang="it-IT" smtClean="0"/>
-              <a:t>29/12/2023</a:t>
+              <a:t>30/12/2023</a:t>
             </a:fld>
             <a:endParaRPr lang="it-IT"/>
           </a:p>
@@ -2544,7 +2656,7 @@
           <a:p>
             <a:fld id="{40850C47-C9E1-44B1-A766-0D0E09416D17}" type="datetime1">
               <a:rPr lang="it-IT" smtClean="0"/>
-              <a:t>29/12/2023</a:t>
+              <a:t>30/12/2023</a:t>
             </a:fld>
             <a:endParaRPr lang="it-IT"/>
           </a:p>
@@ -2809,7 +2921,7 @@
           <a:p>
             <a:fld id="{5FD8E46F-3A5B-41B4-B301-64DC103F3C14}" type="datetime1">
               <a:rPr lang="it-IT" smtClean="0"/>
-              <a:t>29/12/2023</a:t>
+              <a:t>30/12/2023</a:t>
             </a:fld>
             <a:endParaRPr lang="it-IT"/>
           </a:p>
@@ -3221,7 +3333,7 @@
           <a:p>
             <a:fld id="{0F471108-E953-4647-8960-14B1F5A6A495}" type="datetime1">
               <a:rPr lang="it-IT" smtClean="0"/>
-              <a:t>29/12/2023</a:t>
+              <a:t>30/12/2023</a:t>
             </a:fld>
             <a:endParaRPr lang="it-IT"/>
           </a:p>
@@ -3362,7 +3474,7 @@
           <a:p>
             <a:fld id="{D63DD220-8E98-4BE5-981B-AE6F8C9ED92D}" type="datetime1">
               <a:rPr lang="it-IT" smtClean="0"/>
-              <a:t>29/12/2023</a:t>
+              <a:t>30/12/2023</a:t>
             </a:fld>
             <a:endParaRPr lang="it-IT"/>
           </a:p>
@@ -3475,7 +3587,7 @@
           <a:p>
             <a:fld id="{5C1759D6-6E61-4F1D-898E-E020AE9654D3}" type="datetime1">
               <a:rPr lang="it-IT" smtClean="0"/>
-              <a:t>29/12/2023</a:t>
+              <a:t>30/12/2023</a:t>
             </a:fld>
             <a:endParaRPr lang="it-IT"/>
           </a:p>
@@ -3786,7 +3898,7 @@
           <a:p>
             <a:fld id="{0E3C1CD7-F9ED-451F-811B-ADB9E6838B1B}" type="datetime1">
               <a:rPr lang="it-IT" smtClean="0"/>
-              <a:t>29/12/2023</a:t>
+              <a:t>30/12/2023</a:t>
             </a:fld>
             <a:endParaRPr lang="it-IT"/>
           </a:p>
@@ -4074,7 +4186,7 @@
           <a:p>
             <a:fld id="{24F16348-E4C7-4C62-8335-B2C80B5E326D}" type="datetime1">
               <a:rPr lang="it-IT" smtClean="0"/>
-              <a:t>29/12/2023</a:t>
+              <a:t>30/12/2023</a:t>
             </a:fld>
             <a:endParaRPr lang="it-IT"/>
           </a:p>
@@ -4315,7 +4427,7 @@
           <a:p>
             <a:fld id="{A93BCDCC-B3C8-4A08-8EA1-505A1A578C35}" type="datetime1">
               <a:rPr lang="it-IT" smtClean="0"/>
-              <a:t>29/12/2023</a:t>
+              <a:t>30/12/2023</a:t>
             </a:fld>
             <a:endParaRPr lang="it-IT"/>
           </a:p>
@@ -6059,7 +6171,7 @@
           <p:nvPr>
             <p:extLst>
               <p:ext uri="{D42A27DB-BD31-4B8C-83A1-F6EECF244321}">
-                <p14:modId xmlns:p14="http://schemas.microsoft.com/office/powerpoint/2010/main" val="3856147991"/>
+                <p14:modId xmlns:p14="http://schemas.microsoft.com/office/powerpoint/2010/main" val="985935849"/>
               </p:ext>
             </p:extLst>
           </p:nvPr>
@@ -6252,13 +6364,8 @@
                     <a:p>
                       <a:r>
                         <a:rPr lang="en-US" noProof="0" dirty="0"/>
-                        <a:t>Weight </a:t>
+                        <a:t>Weight initialization</a:t>
                       </a:r>
-                      <a:r>
-                        <a:rPr lang="en-US" noProof="0" dirty="0" err="1"/>
-                        <a:t>init</a:t>
-                      </a:r>
-                      <a:endParaRPr lang="en-US" noProof="0" dirty="0"/>
                     </a:p>
                   </a:txBody>
                   <a:tcPr/>
@@ -6676,7 +6783,7 @@
         </p:nvSpPr>
         <p:spPr>
           <a:xfrm>
-            <a:off x="333676" y="4699348"/>
+            <a:off x="361669" y="4690017"/>
             <a:ext cx="3825551" cy="1754326"/>
           </a:xfrm>
           <a:prstGeom prst="rect">
@@ -6691,17 +6798,17 @@
           <a:lstStyle/>
           <a:p>
             <a:r>
-              <a:rPr lang="it-IT" dirty="0" err="1"/>
+              <a:rPr lang="it-IT" b="1" i="1" dirty="0" err="1"/>
               <a:t>Units</a:t>
             </a:r>
             <a:r>
               <a:rPr lang="it-IT" dirty="0"/>
-              <a:t>: (10, 3)</a:t>
-            </a:r>
-          </a:p>
-          <a:p>
-            <a:r>
-              <a:rPr lang="it-IT" dirty="0" err="1"/>
+              <a:t>:  (10, 3)</a:t>
+            </a:r>
+          </a:p>
+          <a:p>
+            <a:r>
+              <a:rPr lang="it-IT" b="1" i="1" dirty="0" err="1"/>
               <a:t>Activations</a:t>
             </a:r>
             <a:r>
@@ -6709,12 +6816,12 @@
               <a:t> </a:t>
             </a:r>
             <a:r>
-              <a:rPr lang="it-IT" dirty="0" err="1"/>
+              <a:rPr lang="it-IT" b="1" i="1" dirty="0" err="1"/>
               <a:t>func</a:t>
             </a:r>
             <a:r>
               <a:rPr lang="it-IT" dirty="0"/>
-              <a:t>: (</a:t>
+              <a:t>:  (</a:t>
             </a:r>
             <a:r>
               <a:rPr lang="it-IT" dirty="0" err="1"/>
@@ -6727,26 +6834,54 @@
           </a:p>
           <a:p>
             <a:r>
+              <a:rPr lang="it-IT" b="1" i="1" dirty="0"/>
+              <a:t>Learning</a:t>
+            </a:r>
+            <a:r>
               <a:rPr lang="it-IT" dirty="0"/>
-              <a:t>Learning rate: 0.008</a:t>
-            </a:r>
-          </a:p>
-          <a:p>
+              <a:t> </a:t>
+            </a:r>
+            <a:r>
+              <a:rPr lang="it-IT" b="1" i="1" dirty="0"/>
+              <a:t>rate</a:t>
+            </a:r>
             <a:r>
               <a:rPr lang="it-IT" dirty="0"/>
-              <a:t>Momentum alpha: 0.85</a:t>
-            </a:r>
-          </a:p>
-          <a:p>
+              <a:t>:  0.008</a:t>
+            </a:r>
+          </a:p>
+          <a:p>
+            <a:r>
+              <a:rPr lang="it-IT" b="1" i="1" dirty="0"/>
+              <a:t>Momentum</a:t>
+            </a:r>
             <a:r>
               <a:rPr lang="it-IT" dirty="0"/>
+              <a:t> </a:t>
+            </a:r>
+            <a:r>
+              <a:rPr lang="it-IT" b="1" i="1" dirty="0"/>
+              <a:t>alpha</a:t>
+            </a:r>
+            <a:r>
+              <a:rPr lang="it-IT" dirty="0"/>
+              <a:t>:  0.85</a:t>
+            </a:r>
+          </a:p>
+          <a:p>
+            <a:r>
+              <a:rPr lang="it-IT" b="1" i="1" dirty="0"/>
               <a:t>Batch</a:t>
             </a:r>
           </a:p>
           <a:p>
             <a:r>
+              <a:rPr lang="it-IT" b="1" i="1" dirty="0"/>
+              <a:t>Lambda</a:t>
+            </a:r>
+            <a:r>
               <a:rPr lang="it-IT" dirty="0"/>
-              <a:t>Lambda: 0</a:t>
+              <a:t>:  0</a:t>
             </a:r>
           </a:p>
         </p:txBody>
@@ -6836,7 +6971,7 @@
         </p:nvSpPr>
         <p:spPr>
           <a:xfrm>
-            <a:off x="4357141" y="4699348"/>
+            <a:off x="4385134" y="4690017"/>
             <a:ext cx="4143570" cy="1754326"/>
           </a:xfrm>
           <a:prstGeom prst="rect">
@@ -6851,17 +6986,17 @@
           <a:lstStyle/>
           <a:p>
             <a:r>
-              <a:rPr lang="it-IT" dirty="0" err="1"/>
+              <a:rPr lang="it-IT" b="1" i="1" dirty="0" err="1"/>
               <a:t>Units</a:t>
             </a:r>
             <a:r>
               <a:rPr lang="it-IT" dirty="0"/>
-              <a:t>: (30, 30, 3)</a:t>
-            </a:r>
-          </a:p>
-          <a:p>
-            <a:r>
-              <a:rPr lang="it-IT" dirty="0" err="1"/>
+              <a:t>:  (30, 30, 3)</a:t>
+            </a:r>
+          </a:p>
+          <a:p>
+            <a:r>
+              <a:rPr lang="it-IT" b="1" i="1" dirty="0" err="1"/>
               <a:t>Activations</a:t>
             </a:r>
             <a:r>
@@ -6869,12 +7004,12 @@
               <a:t> </a:t>
             </a:r>
             <a:r>
-              <a:rPr lang="it-IT" dirty="0" err="1"/>
+              <a:rPr lang="it-IT" b="1" i="1" dirty="0" err="1"/>
               <a:t>func</a:t>
             </a:r>
             <a:r>
               <a:rPr lang="it-IT" dirty="0"/>
-              <a:t>: (</a:t>
+              <a:t>:  (</a:t>
             </a:r>
             <a:r>
               <a:rPr lang="it-IT" dirty="0" err="1"/>
@@ -6895,26 +7030,54 @@
           </a:p>
           <a:p>
             <a:r>
+              <a:rPr lang="it-IT" b="1" i="1" dirty="0"/>
+              <a:t>Learning</a:t>
+            </a:r>
+            <a:r>
               <a:rPr lang="it-IT" dirty="0"/>
-              <a:t>Learning rate: 0.008</a:t>
-            </a:r>
-          </a:p>
-          <a:p>
+              <a:t> </a:t>
+            </a:r>
+            <a:r>
+              <a:rPr lang="it-IT" b="1" i="1" dirty="0"/>
+              <a:t>rate</a:t>
+            </a:r>
             <a:r>
               <a:rPr lang="it-IT" dirty="0"/>
-              <a:t>Momentum alpha: 0.85</a:t>
-            </a:r>
-          </a:p>
-          <a:p>
+              <a:t>:  0.008</a:t>
+            </a:r>
+          </a:p>
+          <a:p>
+            <a:r>
+              <a:rPr lang="it-IT" b="1" i="1" dirty="0"/>
+              <a:t>Momentum</a:t>
+            </a:r>
             <a:r>
               <a:rPr lang="it-IT" dirty="0"/>
+              <a:t> </a:t>
+            </a:r>
+            <a:r>
+              <a:rPr lang="it-IT" b="1" i="1" dirty="0"/>
+              <a:t>alpha</a:t>
+            </a:r>
+            <a:r>
+              <a:rPr lang="it-IT" dirty="0"/>
+              <a:t>:  0.85</a:t>
+            </a:r>
+          </a:p>
+          <a:p>
+            <a:r>
+              <a:rPr lang="it-IT" b="1" i="1" dirty="0"/>
               <a:t>Batch</a:t>
             </a:r>
           </a:p>
           <a:p>
             <a:r>
+              <a:rPr lang="it-IT" b="1" i="1" dirty="0"/>
+              <a:t>Lambda</a:t>
+            </a:r>
+            <a:r>
               <a:rPr lang="it-IT" dirty="0"/>
-              <a:t>Lambda: 0</a:t>
+              <a:t>:  0</a:t>
             </a:r>
           </a:p>
         </p:txBody>
@@ -6969,8 +7132,8 @@
         </p:nvSpPr>
         <p:spPr>
           <a:xfrm>
-            <a:off x="8454056" y="4629973"/>
-            <a:ext cx="3298886" cy="2031325"/>
+            <a:off x="8482049" y="4620642"/>
+            <a:ext cx="3404268" cy="2031325"/>
           </a:xfrm>
           <a:prstGeom prst="rect">
             <a:avLst/>
@@ -6984,17 +7147,17 @@
           <a:lstStyle/>
           <a:p>
             <a:r>
-              <a:rPr lang="it-IT" dirty="0" err="1"/>
+              <a:rPr lang="it-IT" b="1" i="1" dirty="0" err="1"/>
               <a:t>Units</a:t>
             </a:r>
             <a:r>
               <a:rPr lang="it-IT" dirty="0"/>
-              <a:t>: (40, 40, 40, 40, 3)</a:t>
-            </a:r>
-          </a:p>
-          <a:p>
-            <a:r>
-              <a:rPr lang="it-IT" dirty="0" err="1"/>
+              <a:t>:  (40, 40, 40, 40, 3)</a:t>
+            </a:r>
+          </a:p>
+          <a:p>
+            <a:r>
+              <a:rPr lang="it-IT" b="1" i="1" dirty="0" err="1"/>
               <a:t>Activations</a:t>
             </a:r>
             <a:r>
@@ -7002,12 +7165,12 @@
               <a:t> </a:t>
             </a:r>
             <a:r>
-              <a:rPr lang="it-IT" dirty="0" err="1"/>
+              <a:rPr lang="it-IT" b="1" i="1" dirty="0" err="1"/>
               <a:t>func</a:t>
             </a:r>
             <a:r>
               <a:rPr lang="it-IT" dirty="0"/>
-              <a:t>: (</a:t>
+              <a:t>:  (</a:t>
             </a:r>
             <a:r>
               <a:rPr lang="it-IT" dirty="0" err="1"/>
@@ -7044,30 +7207,73 @@
           </a:p>
           <a:p>
             <a:r>
+              <a:rPr lang="it-IT" b="1" i="1" dirty="0"/>
+              <a:t>Learning</a:t>
+            </a:r>
+            <a:r>
               <a:rPr lang="it-IT" dirty="0"/>
-              <a:t>Learning rate: 0.0005</a:t>
-            </a:r>
-          </a:p>
-          <a:p>
+              <a:t> </a:t>
+            </a:r>
+            <a:r>
+              <a:rPr lang="it-IT" b="1" i="1" dirty="0"/>
+              <a:t>rate</a:t>
+            </a:r>
             <a:r>
               <a:rPr lang="it-IT" dirty="0"/>
-              <a:t>Momentum alpha: 0.9</a:t>
-            </a:r>
-          </a:p>
-          <a:p>
-            <a:r>
-              <a:rPr lang="it-IT" dirty="0" err="1"/>
+              <a:t>:  0.0005 </a:t>
+            </a:r>
+            <a:r>
+              <a:rPr lang="it-IT" dirty="0">
+                <a:sym typeface="Wingdings" panose="05000000000000000000" pitchFamily="2" charset="2"/>
+              </a:rPr>
+              <a:t>→ 0.00005</a:t>
+            </a:r>
+            <a:endParaRPr lang="it-IT" dirty="0"/>
+          </a:p>
+          <a:p>
+            <a:r>
+              <a:rPr lang="it-IT" b="1" i="1" dirty="0"/>
+              <a:t>Momentum</a:t>
+            </a:r>
+            <a:r>
+              <a:rPr lang="it-IT" dirty="0"/>
+              <a:t> </a:t>
+            </a:r>
+            <a:r>
+              <a:rPr lang="it-IT" b="1" i="1" dirty="0"/>
+              <a:t>alpha</a:t>
+            </a:r>
+            <a:r>
+              <a:rPr lang="it-IT" dirty="0"/>
+              <a:t>:  0.9</a:t>
+            </a:r>
+          </a:p>
+          <a:p>
+            <a:r>
+              <a:rPr lang="it-IT" b="1" i="1" dirty="0" err="1"/>
               <a:t>Minibatch</a:t>
             </a:r>
             <a:r>
               <a:rPr lang="it-IT" dirty="0"/>
-              <a:t> size: 200</a:t>
-            </a:r>
-          </a:p>
-          <a:p>
+              <a:t> </a:t>
+            </a:r>
+            <a:r>
+              <a:rPr lang="it-IT" b="1" i="1" dirty="0"/>
+              <a:t>size</a:t>
+            </a:r>
             <a:r>
               <a:rPr lang="it-IT" dirty="0"/>
-              <a:t>Lambda: 0</a:t>
+              <a:t>:  200</a:t>
+            </a:r>
+          </a:p>
+          <a:p>
+            <a:r>
+              <a:rPr lang="it-IT" b="1" i="1" dirty="0"/>
+              <a:t>Lambda</a:t>
+            </a:r>
+            <a:r>
+              <a:rPr lang="it-IT" dirty="0"/>
+              <a:t>:  0</a:t>
             </a:r>
           </a:p>
         </p:txBody>
@@ -7254,7 +7460,7 @@
           <a:p>
             <a:r>
               <a:rPr lang="en-US" b="1" dirty="0"/>
-              <a:t>Discussion</a:t>
+              <a:t>CUP Results</a:t>
             </a:r>
             <a:endParaRPr lang="en-US" dirty="0"/>
           </a:p>
@@ -7265,7 +7471,7 @@
           <p:cNvPr id="3" name="CasellaDiTesto 2">
             <a:extLst>
               <a:ext uri="{FF2B5EF4-FFF2-40B4-BE49-F238E27FC236}">
-                <a16:creationId xmlns:a16="http://schemas.microsoft.com/office/drawing/2014/main" id="{0448DF09-38BE-4CA2-C490-2A9388B7B27C}"/>
+                <a16:creationId xmlns:a16="http://schemas.microsoft.com/office/drawing/2014/main" id="{54E0DD3B-63BC-7DC6-3291-D2FDFE5BC30B}"/>
               </a:ext>
             </a:extLst>
           </p:cNvPr>
@@ -7274,8 +7480,8 @@
         </p:nvSpPr>
         <p:spPr>
           <a:xfrm>
-            <a:off x="914400" y="1690688"/>
-            <a:ext cx="10758196" cy="4524315"/>
+            <a:off x="951722" y="1690688"/>
+            <a:ext cx="10674221" cy="4524315"/>
           </a:xfrm>
           <a:prstGeom prst="rect">
             <a:avLst/>
@@ -7288,72 +7494,50 @@
           </a:bodyPr>
           <a:lstStyle/>
           <a:p>
-            <a:pPr marL="285750" indent="-285750">
-              <a:buFont typeface="Arial" panose="020B0604020202020204" pitchFamily="34" charset="0"/>
-              <a:buChar char="•"/>
-            </a:pPr>
             <a:r>
               <a:rPr lang="en-US" sz="2400" dirty="0"/>
-              <a:t>To experiment, we tried many times to overfit the data with big networks and many </a:t>
-            </a:r>
-            <a:r>
-              <a:rPr lang="it-IT" sz="2400" dirty="0"/>
-              <a:t>training </a:t>
-            </a:r>
+              <a:t>With the various grid searches, we noted that with more layer and more units the validation loss tends to decrease.</a:t>
+            </a:r>
+          </a:p>
+          <a:p>
+            <a:endParaRPr lang="en-US" sz="2400" dirty="0"/>
+          </a:p>
+          <a:p>
             <a:r>
               <a:rPr lang="en-US" sz="2400" dirty="0"/>
-              <a:t>epochs but</a:t>
-            </a:r>
-            <a:r>
-              <a:rPr lang="it-IT" sz="2400" dirty="0"/>
-              <a:t> </a:t>
-            </a:r>
+              <a:t>In all the grid search in which was possible to have no regularization, the best model was the one not regularized.</a:t>
+            </a:r>
+          </a:p>
+          <a:p>
             <a:r>
               <a:rPr lang="en-US" sz="2400" dirty="0"/>
-              <a:t>were unable to do so. We only observed that the validation loss start to decrease slower than the training loss. To verify if there were any issues with our simulator, we conducted tests with Keras and obtained the same results.</a:t>
-            </a:r>
-          </a:p>
-          <a:p>
-            <a:pPr marL="285750" indent="-285750">
-              <a:buFont typeface="Arial" panose="020B0604020202020204" pitchFamily="34" charset="0"/>
-              <a:buChar char="•"/>
-            </a:pPr>
+              <a:t>At the same time a higher momentum was preferred.</a:t>
+            </a:r>
+          </a:p>
+          <a:p>
             <a:endParaRPr lang="en-US" sz="2400" dirty="0"/>
           </a:p>
           <a:p>
-            <a:pPr marL="285750" indent="-285750">
-              <a:buFont typeface="Arial" panose="020B0604020202020204" pitchFamily="34" charset="0"/>
-              <a:buChar char="•"/>
-            </a:pPr>
             <a:r>
               <a:rPr lang="en-US" sz="2400" dirty="0"/>
-              <a:t>Computing gradients for all the patterns with matrix multiplication, instead of computing them for one pattern at time using scalar products gives a massive improvement in executions time. This enhancement enables the testing of bigger networks and higher epochs in reasonable time.</a:t>
-            </a:r>
-          </a:p>
-          <a:p>
-            <a:pPr marL="285750" indent="-285750">
-              <a:buFont typeface="Arial" panose="020B0604020202020204" pitchFamily="34" charset="0"/>
-              <a:buChar char="•"/>
-            </a:pPr>
+              <a:t>Training the model with batch shows a more stable curve with very low impact on the training speed.</a:t>
+            </a:r>
+          </a:p>
+          <a:p>
             <a:endParaRPr lang="en-US" sz="2400" dirty="0"/>
           </a:p>
           <a:p>
-            <a:pPr marL="285750" indent="-285750">
-              <a:buFont typeface="Arial" panose="020B0604020202020204" pitchFamily="34" charset="0"/>
-              <a:buChar char="•"/>
-            </a:pPr>
             <a:r>
               <a:rPr lang="en-US" sz="2400" dirty="0"/>
-              <a:t>Momentum is essential for good learning (especially with batch)</a:t>
-            </a:r>
-            <a:endParaRPr lang="it-IT" sz="2400" dirty="0"/>
+              <a:t>Given this, we chose to move towards large models with either no or low regularization, a high momentum, trained with batch and we did a last grid search.</a:t>
+            </a:r>
           </a:p>
         </p:txBody>
       </p:sp>
     </p:spTree>
     <p:extLst>
       <p:ext uri="{BB962C8B-B14F-4D97-AF65-F5344CB8AC3E}">
-        <p14:creationId xmlns:p14="http://schemas.microsoft.com/office/powerpoint/2010/main" val="3244110880"/>
+        <p14:creationId xmlns:p14="http://schemas.microsoft.com/office/powerpoint/2010/main" val="3208590103"/>
       </p:ext>
     </p:extLst>
   </p:cSld>
@@ -7385,7 +7569,7 @@
           <p:cNvPr id="2" name="Titolo 1">
             <a:extLst>
               <a:ext uri="{FF2B5EF4-FFF2-40B4-BE49-F238E27FC236}">
-                <a16:creationId xmlns:a16="http://schemas.microsoft.com/office/drawing/2014/main" id="{32242F0D-F3C7-5888-B659-FAE035653A8D}"/>
+                <a16:creationId xmlns:a16="http://schemas.microsoft.com/office/drawing/2014/main" id="{525B4A98-95E4-1C0A-FEA5-267F85CBE9F5}"/>
               </a:ext>
             </a:extLst>
           </p:cNvPr>
@@ -7401,94 +7585,68 @@
           <a:bodyPr/>
           <a:lstStyle/>
           <a:p>
-            <a:r>
-              <a:rPr lang="en-US" b="1" dirty="0"/>
-              <a:t>Discussion</a:t>
-            </a:r>
-            <a:endParaRPr lang="en-US" dirty="0"/>
-          </a:p>
-        </p:txBody>
-      </p:sp>
-      <p:sp>
-        <p:nvSpPr>
-          <p:cNvPr id="3" name="CasellaDiTesto 2">
-            <a:extLst>
-              <a:ext uri="{FF2B5EF4-FFF2-40B4-BE49-F238E27FC236}">
-                <a16:creationId xmlns:a16="http://schemas.microsoft.com/office/drawing/2014/main" id="{0448DF09-38BE-4CA2-C490-2A9388B7B27C}"/>
-              </a:ext>
-            </a:extLst>
-          </p:cNvPr>
-          <p:cNvSpPr txBox="1"/>
-          <p:nvPr/>
-        </p:nvSpPr>
-        <p:spPr>
-          <a:xfrm>
-            <a:off x="914400" y="1690688"/>
-            <a:ext cx="10758196" cy="3416320"/>
-          </a:xfrm>
-          <a:prstGeom prst="rect">
-            <a:avLst/>
-          </a:prstGeom>
-          <a:noFill/>
-        </p:spPr>
-        <p:txBody>
-          <a:bodyPr wrap="square" rtlCol="0">
-            <a:spAutoFit/>
-          </a:bodyPr>
-          <a:lstStyle/>
-          <a:p>
-            <a:pPr marL="285750" indent="-285750">
-              <a:buFont typeface="Arial" panose="020B0604020202020204" pitchFamily="34" charset="0"/>
-              <a:buChar char="•"/>
-            </a:pPr>
-            <a:r>
-              <a:rPr lang="en-US" sz="2400" dirty="0" err="1"/>
-              <a:t>ReLU</a:t>
-            </a:r>
-            <a:r>
-              <a:rPr lang="en-US" sz="2400" dirty="0"/>
-              <a:t> (and its variants like Leaky </a:t>
-            </a:r>
-            <a:r>
-              <a:rPr lang="en-US" sz="2400" dirty="0" err="1"/>
-              <a:t>ReLU</a:t>
-            </a:r>
-            <a:r>
-              <a:rPr lang="en-US" sz="2400" dirty="0"/>
-              <a:t> and </a:t>
-            </a:r>
-            <a:r>
-              <a:rPr lang="en-US" sz="2400" dirty="0" err="1"/>
-              <a:t>SeLU</a:t>
-            </a:r>
-            <a:r>
-              <a:rPr lang="en-US" sz="2400" dirty="0"/>
-              <a:t>) tends to perform better than other activation functions during the training, with a more uniform and stable gradient descent.</a:t>
-            </a:r>
-          </a:p>
-          <a:p>
-            <a:pPr marL="285750" indent="-285750">
-              <a:buFont typeface="Arial" panose="020B0604020202020204" pitchFamily="34" charset="0"/>
-              <a:buChar char="•"/>
-            </a:pPr>
-            <a:endParaRPr lang="en-US" sz="2400" dirty="0"/>
-          </a:p>
-          <a:p>
-            <a:pPr marL="285750" indent="-285750">
-              <a:buFont typeface="Arial" panose="020B0604020202020204" pitchFamily="34" charset="0"/>
-              <a:buChar char="•"/>
-            </a:pPr>
-            <a:r>
-              <a:rPr lang="en-US" sz="2400" dirty="0"/>
-              <a:t>We realized that performing model selection require a lot of time, more than we had anticipated. Given that small tweaks to neural network hyperparameters yield significant variations in both training dynamics and outcomes, the combinations of hyperparameters to test are truly numerous, and for each is required a careful review.</a:t>
-            </a:r>
+            <a:endParaRPr lang="it-IT"/>
+          </a:p>
+        </p:txBody>
+      </p:sp>
+      <p:sp>
+        <p:nvSpPr>
+          <p:cNvPr id="3" name="Segnaposto contenuto 2">
+            <a:extLst>
+              <a:ext uri="{FF2B5EF4-FFF2-40B4-BE49-F238E27FC236}">
+                <a16:creationId xmlns:a16="http://schemas.microsoft.com/office/drawing/2014/main" id="{898D3325-B379-F040-0DAA-F25CF072AFC0}"/>
+              </a:ext>
+            </a:extLst>
+          </p:cNvPr>
+          <p:cNvSpPr>
+            <a:spLocks noGrp="1"/>
+          </p:cNvSpPr>
+          <p:nvPr>
+            <p:ph idx="1"/>
+          </p:nvPr>
+        </p:nvSpPr>
+        <p:spPr/>
+        <p:txBody>
+          <a:bodyPr/>
+          <a:lstStyle/>
+          <a:p>
+            <a:endParaRPr lang="it-IT"/>
+          </a:p>
+        </p:txBody>
+      </p:sp>
+      <p:sp>
+        <p:nvSpPr>
+          <p:cNvPr id="4" name="Segnaposto numero diapositiva 3">
+            <a:extLst>
+              <a:ext uri="{FF2B5EF4-FFF2-40B4-BE49-F238E27FC236}">
+                <a16:creationId xmlns:a16="http://schemas.microsoft.com/office/drawing/2014/main" id="{4C11A3A1-F2FF-000C-0585-34D005B95E97}"/>
+              </a:ext>
+            </a:extLst>
+          </p:cNvPr>
+          <p:cNvSpPr>
+            <a:spLocks noGrp="1"/>
+          </p:cNvSpPr>
+          <p:nvPr>
+            <p:ph type="sldNum" sz="quarter" idx="12"/>
+          </p:nvPr>
+        </p:nvSpPr>
+        <p:spPr/>
+        <p:txBody>
+          <a:bodyPr/>
+          <a:lstStyle/>
+          <a:p>
+            <a:fld id="{642154B9-5AE1-4D93-9ACE-3DF3B522DF2F}" type="slidenum">
+              <a:rPr lang="it-IT" smtClean="0"/>
+              <a:t>17</a:t>
+            </a:fld>
+            <a:endParaRPr lang="it-IT"/>
           </a:p>
         </p:txBody>
       </p:sp>
     </p:spTree>
     <p:extLst>
       <p:ext uri="{BB962C8B-B14F-4D97-AF65-F5344CB8AC3E}">
-        <p14:creationId xmlns:p14="http://schemas.microsoft.com/office/powerpoint/2010/main" val="689527355"/>
+        <p14:creationId xmlns:p14="http://schemas.microsoft.com/office/powerpoint/2010/main" val="32131640"/>
       </p:ext>
     </p:extLst>
   </p:cSld>
@@ -7538,7 +7696,7 @@
           <a:p>
             <a:r>
               <a:rPr lang="en-US" b="1" dirty="0"/>
-              <a:t>Conclusion</a:t>
+              <a:t>Discussion</a:t>
             </a:r>
             <a:endParaRPr lang="en-US" dirty="0"/>
           </a:p>
@@ -7559,7 +7717,7 @@
         <p:spPr>
           <a:xfrm>
             <a:off x="914400" y="1690688"/>
-            <a:ext cx="10758196" cy="3416320"/>
+            <a:ext cx="10758196" cy="4524315"/>
           </a:xfrm>
           <a:prstGeom prst="rect">
             <a:avLst/>
@@ -7572,32 +7730,224 @@
           </a:bodyPr>
           <a:lstStyle/>
           <a:p>
+            <a:pPr marL="285750" indent="-285750">
+              <a:buFont typeface="Arial" panose="020B0604020202020204" pitchFamily="34" charset="0"/>
+              <a:buChar char="•"/>
+            </a:pPr>
             <a:r>
               <a:rPr lang="en-US" sz="2400" dirty="0"/>
-              <a:t>This project allowed us to find a connection between the theory and the practice studied during the course, indeed we dialed with overfitting, regularization, networks architecture and many other aspects discussed in the lectures.</a:t>
-            </a:r>
-          </a:p>
-          <a:p>
+              <a:t>To experiment, we tried many times to overfit the data with big networks and many </a:t>
+            </a:r>
+            <a:r>
+              <a:rPr lang="it-IT" sz="2400" dirty="0"/>
+              <a:t>training </a:t>
+            </a:r>
+            <a:r>
+              <a:rPr lang="en-US" sz="2400" dirty="0"/>
+              <a:t>epochs but</a:t>
+            </a:r>
+            <a:r>
+              <a:rPr lang="it-IT" sz="2400" dirty="0"/>
+              <a:t> </a:t>
+            </a:r>
+            <a:r>
+              <a:rPr lang="en-US" sz="2400" dirty="0"/>
+              <a:t>were unable to do so. We only observed that the validation loss start to decrease slower than the training loss. To verify if there were any issues with our simulator, we conducted tests with Keras and obtained the same results.</a:t>
+            </a:r>
+          </a:p>
+          <a:p>
+            <a:pPr marL="285750" indent="-285750">
+              <a:buFont typeface="Arial" panose="020B0604020202020204" pitchFamily="34" charset="0"/>
+              <a:buChar char="•"/>
+            </a:pPr>
             <a:endParaRPr lang="en-US" sz="2400" dirty="0"/>
           </a:p>
           <a:p>
+            <a:pPr marL="285750" indent="-285750">
+              <a:buFont typeface="Arial" panose="020B0604020202020204" pitchFamily="34" charset="0"/>
+              <a:buChar char="•"/>
+            </a:pPr>
             <a:r>
               <a:rPr lang="en-US" sz="2400" dirty="0"/>
-              <a:t>Creating an NN simulator from scratch was a demanding challenge, but very educational. This collaborative project not only expanded our technical knowledge but also enriched our experience in working collaboratively within a group setting.</a:t>
-            </a:r>
-          </a:p>
-          <a:p>
+              <a:t>Computing gradients for all the patterns with matrix multiplication, instead of computing them for one pattern at time using scalar products gives a massive improvement in executions time. This enhancement enables the testing of bigger networks and higher epochs in reasonable time.</a:t>
+            </a:r>
+          </a:p>
+          <a:p>
+            <a:pPr marL="285750" indent="-285750">
+              <a:buFont typeface="Arial" panose="020B0604020202020204" pitchFamily="34" charset="0"/>
+              <a:buChar char="•"/>
+            </a:pPr>
             <a:endParaRPr lang="en-US" sz="2400" dirty="0"/>
           </a:p>
           <a:p>
-            <a:endParaRPr lang="en-US" sz="2400" dirty="0"/>
+            <a:pPr marL="285750" indent="-285750">
+              <a:buFont typeface="Arial" panose="020B0604020202020204" pitchFamily="34" charset="0"/>
+              <a:buChar char="•"/>
+            </a:pPr>
+            <a:r>
+              <a:rPr lang="en-US" sz="2400" dirty="0"/>
+              <a:t>Momentum is essential for good learning (especially with batch)</a:t>
+            </a:r>
+            <a:endParaRPr lang="it-IT" sz="2400" dirty="0"/>
           </a:p>
         </p:txBody>
       </p:sp>
     </p:spTree>
     <p:extLst>
       <p:ext uri="{BB962C8B-B14F-4D97-AF65-F5344CB8AC3E}">
-        <p14:creationId xmlns:p14="http://schemas.microsoft.com/office/powerpoint/2010/main" val="2108753129"/>
+        <p14:creationId xmlns:p14="http://schemas.microsoft.com/office/powerpoint/2010/main" val="3244110880"/>
+      </p:ext>
+    </p:extLst>
+  </p:cSld>
+  <p:clrMapOvr>
+    <a:masterClrMapping/>
+  </p:clrMapOvr>
+</p:sld>
+</file>
+
+<file path=ppt/slides/slide19.xml><?xml version="1.0" encoding="utf-8"?>
+<p:sld xmlns:a="http://schemas.openxmlformats.org/drawingml/2006/main" xmlns:r="http://schemas.openxmlformats.org/officeDocument/2006/relationships" xmlns:p="http://schemas.openxmlformats.org/presentationml/2006/main">
+  <p:cSld>
+    <p:spTree>
+      <p:nvGrpSpPr>
+        <p:cNvPr id="1" name=""/>
+        <p:cNvGrpSpPr/>
+        <p:nvPr/>
+      </p:nvGrpSpPr>
+      <p:grpSpPr>
+        <a:xfrm>
+          <a:off x="0" y="0"/>
+          <a:ext cx="0" cy="0"/>
+          <a:chOff x="0" y="0"/>
+          <a:chExt cx="0" cy="0"/>
+        </a:xfrm>
+      </p:grpSpPr>
+      <p:sp>
+        <p:nvSpPr>
+          <p:cNvPr id="2" name="Titolo 1">
+            <a:extLst>
+              <a:ext uri="{FF2B5EF4-FFF2-40B4-BE49-F238E27FC236}">
+                <a16:creationId xmlns:a16="http://schemas.microsoft.com/office/drawing/2014/main" id="{32242F0D-F3C7-5888-B659-FAE035653A8D}"/>
+              </a:ext>
+            </a:extLst>
+          </p:cNvPr>
+          <p:cNvSpPr>
+            <a:spLocks noGrp="1"/>
+          </p:cNvSpPr>
+          <p:nvPr>
+            <p:ph type="title"/>
+          </p:nvPr>
+        </p:nvSpPr>
+        <p:spPr/>
+        <p:txBody>
+          <a:bodyPr/>
+          <a:lstStyle/>
+          <a:p>
+            <a:r>
+              <a:rPr lang="en-US" b="1" dirty="0"/>
+              <a:t>Discussion</a:t>
+            </a:r>
+            <a:endParaRPr lang="en-US" dirty="0"/>
+          </a:p>
+        </p:txBody>
+      </p:sp>
+      <p:sp>
+        <p:nvSpPr>
+          <p:cNvPr id="3" name="CasellaDiTesto 2">
+            <a:extLst>
+              <a:ext uri="{FF2B5EF4-FFF2-40B4-BE49-F238E27FC236}">
+                <a16:creationId xmlns:a16="http://schemas.microsoft.com/office/drawing/2014/main" id="{0448DF09-38BE-4CA2-C490-2A9388B7B27C}"/>
+              </a:ext>
+            </a:extLst>
+          </p:cNvPr>
+          <p:cNvSpPr txBox="1"/>
+          <p:nvPr/>
+        </p:nvSpPr>
+        <p:spPr>
+          <a:xfrm>
+            <a:off x="914400" y="1690688"/>
+            <a:ext cx="10758196" cy="4524315"/>
+          </a:xfrm>
+          <a:prstGeom prst="rect">
+            <a:avLst/>
+          </a:prstGeom>
+          <a:noFill/>
+        </p:spPr>
+        <p:txBody>
+          <a:bodyPr wrap="square" rtlCol="0">
+            <a:spAutoFit/>
+          </a:bodyPr>
+          <a:lstStyle/>
+          <a:p>
+            <a:pPr marL="285750" indent="-285750">
+              <a:buFont typeface="Arial" panose="020B0604020202020204" pitchFamily="34" charset="0"/>
+              <a:buChar char="•"/>
+            </a:pPr>
+            <a:r>
+              <a:rPr lang="en-US" sz="2400" dirty="0" err="1"/>
+              <a:t>ReLU</a:t>
+            </a:r>
+            <a:r>
+              <a:rPr lang="en-US" sz="2400" dirty="0"/>
+              <a:t> (and its variants like Leaky </a:t>
+            </a:r>
+            <a:r>
+              <a:rPr lang="en-US" sz="2400" dirty="0" err="1"/>
+              <a:t>ReLU</a:t>
+            </a:r>
+            <a:r>
+              <a:rPr lang="en-US" sz="2400" dirty="0"/>
+              <a:t> and </a:t>
+            </a:r>
+            <a:r>
+              <a:rPr lang="en-US" sz="2400" dirty="0" err="1"/>
+              <a:t>SeLU</a:t>
+            </a:r>
+            <a:r>
+              <a:rPr lang="en-US" sz="2400" dirty="0"/>
+              <a:t>) tends to perform better than other activation functions during the training, with a more uniform and stable gradient descent.</a:t>
+            </a:r>
+          </a:p>
+          <a:p>
+            <a:pPr marL="285750" indent="-285750">
+              <a:buFont typeface="Arial" panose="020B0604020202020204" pitchFamily="34" charset="0"/>
+              <a:buChar char="•"/>
+            </a:pPr>
+            <a:endParaRPr lang="en-US" sz="2400" dirty="0"/>
+          </a:p>
+          <a:p>
+            <a:pPr marL="285750" indent="-285750">
+              <a:buFont typeface="Arial" panose="020B0604020202020204" pitchFamily="34" charset="0"/>
+              <a:buChar char="•"/>
+            </a:pPr>
+            <a:r>
+              <a:rPr lang="en-US" sz="2400" dirty="0"/>
+              <a:t>We realized that performing model selection require a lot of time, more than we had anticipated. Given that small tweaks to neural network hyperparameters yield significant variations in both training dynamics and outcomes, the combinations of hyperparameters to test are truly numerous, and for each is required a careful review.</a:t>
+            </a:r>
+          </a:p>
+          <a:p>
+            <a:pPr marL="285750" indent="-285750">
+              <a:buFont typeface="Arial" panose="020B0604020202020204" pitchFamily="34" charset="0"/>
+              <a:buChar char="•"/>
+            </a:pPr>
+            <a:endParaRPr lang="en-US" sz="2400" dirty="0"/>
+          </a:p>
+          <a:p>
+            <a:pPr marL="285750" indent="-285750">
+              <a:buFont typeface="Arial" panose="020B0604020202020204" pitchFamily="34" charset="0"/>
+              <a:buChar char="•"/>
+            </a:pPr>
+            <a:r>
+              <a:rPr lang="en-US" sz="2400" dirty="0"/>
+              <a:t>Rescaling the data using znorm (mean to 0, standard deviation to 1) did not improve the results</a:t>
+            </a:r>
+          </a:p>
+        </p:txBody>
+      </p:sp>
+    </p:spTree>
+    <p:extLst>
+      <p:ext uri="{BB962C8B-B14F-4D97-AF65-F5344CB8AC3E}">
+        <p14:creationId xmlns:p14="http://schemas.microsoft.com/office/powerpoint/2010/main" val="689527355"/>
       </p:ext>
     </p:extLst>
   </p:cSld>
@@ -7737,6 +8087,118 @@
     <p:extLst>
       <p:ext uri="{BB962C8B-B14F-4D97-AF65-F5344CB8AC3E}">
         <p14:creationId xmlns:p14="http://schemas.microsoft.com/office/powerpoint/2010/main" val="1035383574"/>
+      </p:ext>
+    </p:extLst>
+  </p:cSld>
+  <p:clrMapOvr>
+    <a:masterClrMapping/>
+  </p:clrMapOvr>
+</p:sld>
+</file>
+
+<file path=ppt/slides/slide20.xml><?xml version="1.0" encoding="utf-8"?>
+<p:sld xmlns:a="http://schemas.openxmlformats.org/drawingml/2006/main" xmlns:r="http://schemas.openxmlformats.org/officeDocument/2006/relationships" xmlns:p="http://schemas.openxmlformats.org/presentationml/2006/main">
+  <p:cSld>
+    <p:spTree>
+      <p:nvGrpSpPr>
+        <p:cNvPr id="1" name=""/>
+        <p:cNvGrpSpPr/>
+        <p:nvPr/>
+      </p:nvGrpSpPr>
+      <p:grpSpPr>
+        <a:xfrm>
+          <a:off x="0" y="0"/>
+          <a:ext cx="0" cy="0"/>
+          <a:chOff x="0" y="0"/>
+          <a:chExt cx="0" cy="0"/>
+        </a:xfrm>
+      </p:grpSpPr>
+      <p:sp>
+        <p:nvSpPr>
+          <p:cNvPr id="2" name="Titolo 1">
+            <a:extLst>
+              <a:ext uri="{FF2B5EF4-FFF2-40B4-BE49-F238E27FC236}">
+                <a16:creationId xmlns:a16="http://schemas.microsoft.com/office/drawing/2014/main" id="{32242F0D-F3C7-5888-B659-FAE035653A8D}"/>
+              </a:ext>
+            </a:extLst>
+          </p:cNvPr>
+          <p:cNvSpPr>
+            <a:spLocks noGrp="1"/>
+          </p:cNvSpPr>
+          <p:nvPr>
+            <p:ph type="title"/>
+          </p:nvPr>
+        </p:nvSpPr>
+        <p:spPr/>
+        <p:txBody>
+          <a:bodyPr/>
+          <a:lstStyle/>
+          <a:p>
+            <a:r>
+              <a:rPr lang="en-US" b="1" dirty="0"/>
+              <a:t>Conclusions</a:t>
+            </a:r>
+            <a:endParaRPr lang="en-US" dirty="0"/>
+          </a:p>
+        </p:txBody>
+      </p:sp>
+      <p:sp>
+        <p:nvSpPr>
+          <p:cNvPr id="3" name="CasellaDiTesto 2">
+            <a:extLst>
+              <a:ext uri="{FF2B5EF4-FFF2-40B4-BE49-F238E27FC236}">
+                <a16:creationId xmlns:a16="http://schemas.microsoft.com/office/drawing/2014/main" id="{0448DF09-38BE-4CA2-C490-2A9388B7B27C}"/>
+              </a:ext>
+            </a:extLst>
+          </p:cNvPr>
+          <p:cNvSpPr txBox="1"/>
+          <p:nvPr/>
+        </p:nvSpPr>
+        <p:spPr>
+          <a:xfrm>
+            <a:off x="838200" y="1690688"/>
+            <a:ext cx="10758196" cy="4154984"/>
+          </a:xfrm>
+          <a:prstGeom prst="rect">
+            <a:avLst/>
+          </a:prstGeom>
+          <a:noFill/>
+        </p:spPr>
+        <p:txBody>
+          <a:bodyPr wrap="square" rtlCol="0">
+            <a:spAutoFit/>
+          </a:bodyPr>
+          <a:lstStyle/>
+          <a:p>
+            <a:r>
+              <a:rPr lang="en-US" sz="2400" dirty="0"/>
+              <a:t>This project allowed us to find a connection between the theory and the practice studied during the course, indeed we dialed with overfitting, regularization, networks architecture and many other aspects discussed in the lectures.</a:t>
+            </a:r>
+          </a:p>
+          <a:p>
+            <a:endParaRPr lang="en-US" sz="2400" dirty="0"/>
+          </a:p>
+          <a:p>
+            <a:r>
+              <a:rPr lang="en-US" sz="2400" dirty="0"/>
+              <a:t>Creating an NN simulator from scratch was a demanding challenge, but very educational. This collaborative project not only expanded our technical knowledge but also enriched our experience in working collaboratively within a group setting.</a:t>
+            </a:r>
+          </a:p>
+          <a:p>
+            <a:endParaRPr lang="en-US" sz="2400" dirty="0"/>
+          </a:p>
+          <a:p>
+            <a:r>
+              <a:rPr lang="en-US" sz="2400" dirty="0"/>
+              <a:t>In conclusion regarding our project, we believe we've not only delved into fascinating concepts but also acquired practical skills that will prove precious in our academic and professional journey ahead. </a:t>
+            </a:r>
+          </a:p>
+        </p:txBody>
+      </p:sp>
+    </p:spTree>
+    <p:extLst>
+      <p:ext uri="{BB962C8B-B14F-4D97-AF65-F5344CB8AC3E}">
+        <p14:creationId xmlns:p14="http://schemas.microsoft.com/office/powerpoint/2010/main" val="2108753129"/>
       </p:ext>
     </p:extLst>
   </p:cSld>

</xml_diff>